<commit_message>
Update 1.2 with mitch's comments, move resource to resources
</commit_message>
<xml_diff>
--- a/Slides/Module 01.2 User Stories.pptx
+++ b/Slides/Module 01.2 User Stories.pptx
@@ -1328,12 +1328,18 @@
           <a:lstStyle/>
           <a:p>
             <a:r>
-              <a:rPr lang="en-US"/>
-              <a:t>User stories and COSs must be prioritized as Essential, Desirable or Extension.</a:t>
-            </a:r>
-          </a:p>
-          <a:p>
-            <a:endParaRPr lang="en-US"/>
+              <a:rPr lang="en-US" dirty="0"/>
+              <a:t>COSs must be prioritized as Essential, Desirable or Extension.</a:t>
+            </a:r>
+          </a:p>
+          <a:p>
+            <a:endParaRPr lang="en-US" dirty="0"/>
+          </a:p>
+          <a:p>
+            <a:r>
+              <a:rPr lang="en-US" dirty="0"/>
+              <a:t>(Sometimes user stories are also prioritized, but in the class project this semester, we’re not going to prioritize user stories in the same way.)</a:t>
+            </a:r>
           </a:p>
         </p:txBody>
       </p:sp>
@@ -13038,94 +13044,6 @@
       </p:sp>
       <p:sp>
         <p:nvSpPr>
-          <p:cNvPr id="6" name="Content Placeholder 5">
-            <a:extLst>
-              <a:ext uri="{FF2B5EF4-FFF2-40B4-BE49-F238E27FC236}">
-                <a16:creationId xmlns:a16="http://schemas.microsoft.com/office/drawing/2014/main" id="{D11639B4-D866-1713-D01E-555C8F847DDF}"/>
-              </a:ext>
-            </a:extLst>
-          </p:cNvPr>
-          <p:cNvSpPr>
-            <a:spLocks noGrp="1"/>
-          </p:cNvSpPr>
-          <p:nvPr>
-            <p:ph idx="1"/>
-          </p:nvPr>
-        </p:nvSpPr>
-        <p:spPr>
-          <a:xfrm>
-            <a:off x="1432703" y="2456615"/>
-            <a:ext cx="9326593" cy="1708866"/>
-          </a:xfrm>
-        </p:spPr>
-        <p:txBody>
-          <a:bodyPr>
-            <a:normAutofit/>
-          </a:bodyPr>
-          <a:lstStyle/>
-          <a:p>
-            <a:pPr marL="0" indent="0">
-              <a:buNone/>
-            </a:pPr>
-            <a:r>
-              <a:rPr lang="en-US" b="1" i="1" dirty="0">
-                <a:latin typeface="Ink Free" panose="03080402000500000000" pitchFamily="66" charset="0"/>
-              </a:rPr>
-              <a:t>As a(n) </a:t>
-            </a:r>
-            <a:r>
-              <a:rPr lang="en-US" b="1" i="1" u="sng" dirty="0">
-                <a:latin typeface="Ink Free" panose="03080402000500000000" pitchFamily="66" charset="0"/>
-              </a:rPr>
-              <a:t>active outdoor park-goer</a:t>
-            </a:r>
-            <a:br>
-              <a:rPr lang="en-US" dirty="0"/>
-            </a:br>
-            <a:r>
-              <a:rPr lang="en-US" b="1" i="1" dirty="0">
-                <a:latin typeface="Ink Free" panose="03080402000500000000" pitchFamily="66" charset="0"/>
-              </a:rPr>
-              <a:t>I want a </a:t>
-            </a:r>
-            <a:r>
-              <a:rPr lang="en-US" b="1" i="1" u="sng" dirty="0">
-                <a:latin typeface="Ink Free" panose="03080402000500000000" pitchFamily="66" charset="0"/>
-              </a:rPr>
-              <a:t>safe way to fly through </a:t>
-            </a:r>
-            <a:br>
-              <a:rPr lang="en-US" b="1" i="1" u="sng" dirty="0">
-                <a:latin typeface="Ink Free" panose="03080402000500000000" pitchFamily="66" charset="0"/>
-              </a:rPr>
-            </a:br>
-            <a:r>
-              <a:rPr lang="en-US" b="1" i="1" u="sng" dirty="0">
-                <a:latin typeface="Ink Free" panose="03080402000500000000" pitchFamily="66" charset="0"/>
-              </a:rPr>
-              <a:t>the air under a tree</a:t>
-            </a:r>
-            <a:br>
-              <a:rPr lang="en-US" dirty="0"/>
-            </a:br>
-            <a:r>
-              <a:rPr lang="en-US" b="1" i="1" dirty="0">
-                <a:latin typeface="Ink Free" panose="03080402000500000000" pitchFamily="66" charset="0"/>
-              </a:rPr>
-              <a:t>so that I can </a:t>
-            </a:r>
-            <a:r>
-              <a:rPr lang="en-US" b="1" i="1" u="sng" dirty="0">
-                <a:latin typeface="Ink Free" panose="03080402000500000000" pitchFamily="66" charset="0"/>
-              </a:rPr>
-              <a:t>feel the wind in my hair</a:t>
-            </a:r>
-            <a:endParaRPr lang="en-US" u="sng" dirty="0"/>
-          </a:p>
-        </p:txBody>
-      </p:sp>
-      <p:sp>
-        <p:nvSpPr>
           <p:cNvPr id="8" name="TextBox 7">
             <a:extLst>
               <a:ext uri="{FF2B5EF4-FFF2-40B4-BE49-F238E27FC236}">
@@ -13230,6 +13148,170 @@
           </a:extLst>
         </p:spPr>
       </p:pic>
+      <p:sp>
+        <p:nvSpPr>
+          <p:cNvPr id="4" name="TextBox 3">
+            <a:extLst>
+              <a:ext uri="{FF2B5EF4-FFF2-40B4-BE49-F238E27FC236}">
+                <a16:creationId xmlns:a16="http://schemas.microsoft.com/office/drawing/2014/main" id="{3DD9DC61-0E66-37B4-6DFC-58DD8B5D9D9D}"/>
+              </a:ext>
+            </a:extLst>
+          </p:cNvPr>
+          <p:cNvSpPr txBox="1"/>
+          <p:nvPr/>
+        </p:nvSpPr>
+        <p:spPr>
+          <a:xfrm>
+            <a:off x="1753008" y="3749434"/>
+            <a:ext cx="9824703" cy="1569660"/>
+          </a:xfrm>
+          <a:prstGeom prst="rect">
+            <a:avLst/>
+          </a:prstGeom>
+          <a:noFill/>
+          <a:ln w="12700" cap="flat" cmpd="sng" algn="ctr">
+            <a:noFill/>
+            <a:prstDash val="solid"/>
+            <a:miter lim="800000"/>
+          </a:ln>
+          <a:effectLst/>
+        </p:spPr>
+        <p:style>
+          <a:lnRef idx="2">
+            <a:schemeClr val="accent1">
+              <a:shade val="50000"/>
+            </a:schemeClr>
+          </a:lnRef>
+          <a:fillRef idx="1">
+            <a:schemeClr val="accent1"/>
+          </a:fillRef>
+          <a:effectRef idx="0">
+            <a:schemeClr val="accent1"/>
+          </a:effectRef>
+          <a:fontRef idx="minor">
+            <a:schemeClr val="lt1"/>
+          </a:fontRef>
+        </p:style>
+        <p:txBody>
+          <a:bodyPr wrap="square">
+            <a:spAutoFit/>
+          </a:bodyPr>
+          <a:lstStyle/>
+          <a:p>
+            <a:pPr lvl="0">
+              <a:defRPr/>
+            </a:pPr>
+            <a:r>
+              <a:rPr kumimoji="0" lang="en-US" sz="3200" b="1" i="1" u="none" strike="noStrike" kern="1200" cap="none" spc="0" normalizeH="0" baseline="0" noProof="0" dirty="0">
+                <a:ln>
+                  <a:noFill/>
+                </a:ln>
+                <a:solidFill>
+                  <a:srgbClr val="FF0000"/>
+                </a:solidFill>
+                <a:effectLst/>
+                <a:uLnTx/>
+                <a:uFillTx/>
+                <a:latin typeface="Ink Free" panose="03080402000500000000" pitchFamily="66" charset="0"/>
+                <a:ea typeface="+mn-ea"/>
+                <a:cs typeface="+mn-cs"/>
+              </a:rPr>
+              <a:t>As a(n) </a:t>
+            </a:r>
+            <a:r>
+              <a:rPr lang="en-US" sz="3200" b="1" i="1" u="sng" dirty="0">
+                <a:solidFill>
+                  <a:srgbClr val="FF0000"/>
+                </a:solidFill>
+                <a:latin typeface="Ink Free" panose="03080402000500000000" pitchFamily="66" charset="0"/>
+              </a:rPr>
+              <a:t>active outdoor park-goer</a:t>
+            </a:r>
+            <a:br>
+              <a:rPr kumimoji="0" lang="en-US" sz="3200" b="1" i="1" u="none" strike="noStrike" kern="1200" cap="none" spc="0" normalizeH="0" baseline="0" noProof="0" dirty="0">
+                <a:ln>
+                  <a:noFill/>
+                </a:ln>
+                <a:solidFill>
+                  <a:srgbClr val="FF0000"/>
+                </a:solidFill>
+                <a:effectLst/>
+                <a:uLnTx/>
+                <a:uFillTx/>
+                <a:latin typeface="Ink Free" panose="03080402000500000000" pitchFamily="66" charset="0"/>
+                <a:ea typeface="+mn-ea"/>
+                <a:cs typeface="+mn-cs"/>
+              </a:rPr>
+            </a:br>
+            <a:r>
+              <a:rPr kumimoji="0" lang="en-US" sz="3200" b="1" i="1" u="none" strike="noStrike" kern="1200" cap="none" spc="0" normalizeH="0" baseline="0" noProof="0" dirty="0">
+                <a:ln>
+                  <a:noFill/>
+                </a:ln>
+                <a:solidFill>
+                  <a:srgbClr val="FF0000"/>
+                </a:solidFill>
+                <a:effectLst/>
+                <a:uLnTx/>
+                <a:uFillTx/>
+                <a:latin typeface="Ink Free" panose="03080402000500000000" pitchFamily="66" charset="0"/>
+                <a:ea typeface="+mn-ea"/>
+                <a:cs typeface="+mn-cs"/>
+              </a:rPr>
+              <a:t>I want </a:t>
+            </a:r>
+            <a:r>
+              <a:rPr lang="en-US" sz="3200" b="1" i="1" u="sng" dirty="0">
+                <a:solidFill>
+                  <a:srgbClr val="FF0000"/>
+                </a:solidFill>
+                <a:latin typeface="Ink Free" panose="03080402000500000000" pitchFamily="66" charset="0"/>
+              </a:rPr>
+              <a:t>a safe way to fly through the air under a tree </a:t>
+            </a:r>
+            <a:r>
+              <a:rPr kumimoji="0" lang="en-US" sz="3200" b="1" i="1" u="none" strike="noStrike" kern="1200" cap="none" spc="0" normalizeH="0" baseline="0" noProof="0" dirty="0">
+                <a:ln>
+                  <a:noFill/>
+                </a:ln>
+                <a:solidFill>
+                  <a:srgbClr val="FF0000"/>
+                </a:solidFill>
+                <a:effectLst/>
+                <a:uLnTx/>
+                <a:uFillTx/>
+                <a:latin typeface="Ink Free" panose="03080402000500000000" pitchFamily="66" charset="0"/>
+                <a:ea typeface="+mn-ea"/>
+                <a:cs typeface="+mn-cs"/>
+              </a:rPr>
+              <a:t>so that I can </a:t>
+            </a:r>
+            <a:r>
+              <a:rPr lang="en-US" sz="3200" b="1" i="1" u="sng" dirty="0">
+                <a:solidFill>
+                  <a:srgbClr val="FF0000"/>
+                </a:solidFill>
+                <a:latin typeface="Ink Free" panose="03080402000500000000" pitchFamily="66" charset="0"/>
+              </a:rPr>
+              <a:t>feel the wind in my hair</a:t>
+            </a:r>
+            <a:endParaRPr kumimoji="0" lang="en-US" sz="3200" b="1" i="1" u="none" strike="noStrike" kern="1200" cap="none" spc="0" normalizeH="0" baseline="0" noProof="0" dirty="0">
+              <a:ln>
+                <a:noFill/>
+              </a:ln>
+              <a:solidFill>
+                <a:srgbClr val="FF0000"/>
+              </a:solidFill>
+              <a:effectLst/>
+              <a:uLnTx/>
+              <a:uFillTx/>
+              <a:latin typeface="Ink Free" panose="03080402000500000000" pitchFamily="66" charset="0"/>
+              <a:ea typeface="+mn-ea"/>
+              <a:cs typeface="+mn-cs"/>
+            </a:endParaRPr>
+          </a:p>
+        </p:txBody>
+      </p:sp>
     </p:spTree>
     <p:extLst>
       <p:ext uri="{BB962C8B-B14F-4D97-AF65-F5344CB8AC3E}">
@@ -13294,7 +13376,7 @@
           <a:p>
             <a:r>
               <a:rPr lang="en-US" dirty="0"/>
-              <a:t>User stories: format</a:t>
+              <a:t>What are user stories?</a:t>
             </a:r>
           </a:p>
         </p:txBody>
@@ -13343,7 +13425,7 @@
           <a:p>
             <a:r>
               <a:rPr lang="en-US" dirty="0"/>
-              <a:t>…a tool tool for keeping large collaborative teams on the same page when </a:t>
+              <a:t>…a tool for keeping large collaborative teams on the same page when </a:t>
             </a:r>
             <a:r>
               <a:rPr lang="en-US" b="1" dirty="0"/>

</xml_diff>

<commit_message>
update slides to Mitch's comments
</commit_message>
<xml_diff>
--- a/Slides/Module 01.2 User Stories.pptx
+++ b/Slides/Module 01.2 User Stories.pptx
@@ -271,7 +271,7 @@
           <a:p>
             <a:fld id="{7C7E5181-6CF5-45F7-A87A-E0E0B1FD7549}" type="datetimeFigureOut">
               <a:rPr lang="en-US" smtClean="0"/>
-              <a:t>12/30/25</a:t>
+              <a:t>1/1/26</a:t>
             </a:fld>
             <a:endParaRPr lang="en-US"/>
           </a:p>
@@ -2998,16 +2998,33 @@
           <a:p>
             <a:r>
               <a:rPr lang="en-US" dirty="0"/>
-              <a:t>The overall question for Requirements Gathering is making sure that we are building the right thing, which we’ll talk about more the next time we meet. </a:t>
+              <a:t>This meme does a great job capturing the many ways in which we can get off course and end up building the wrong thing.</a:t>
             </a:r>
           </a:p>
           <a:p>
             <a:endParaRPr lang="en-US" dirty="0"/>
           </a:p>
           <a:p>
-            <a:r>
-              <a:rPr lang="en-US" dirty="0"/>
-              <a:t>This meme does a great job capturing the many ways in which we can get off course and end up building the wrong thing.</a:t>
+            <a:pPr marL="0" marR="0" lvl="0" indent="0" algn="l" defTabSz="914400" rtl="0" eaLnBrk="1" fontAlgn="auto" latinLnBrk="0" hangingPunct="1">
+              <a:lnSpc>
+                <a:spcPct val="100000"/>
+              </a:lnSpc>
+              <a:spcBef>
+                <a:spcPts val="0"/>
+              </a:spcBef>
+              <a:spcAft>
+                <a:spcPts val="0"/>
+              </a:spcAft>
+              <a:buClrTx/>
+              <a:buSzTx/>
+              <a:buFontTx/>
+              <a:buNone/>
+              <a:tabLst/>
+              <a:defRPr/>
+            </a:pPr>
+            <a:r>
+              <a:rPr lang="en-US" dirty="0"/>
+              <a:t>We’re going to talk more about requirements gathering and where user stories actually come from in the next module.</a:t>
             </a:r>
           </a:p>
           <a:p>
@@ -3132,8 +3149,79 @@
             </a:pPr>
             <a:r>
               <a:rPr lang="en-US" dirty="0"/>
-              <a:t>User stories are a way of capturing the user’s stated goals in a way that hopefully helps us build the right thing — that’s the main topic for this lecture.</a:t>
-            </a:r>
+              <a:t>A tool of software engineering that we’ll use centrally this semester is the </a:t>
+            </a:r>
+            <a:r>
+              <a:rPr lang="en-US" b="1" dirty="0"/>
+              <a:t>user story</a:t>
+            </a:r>
+            <a:r>
+              <a:rPr lang="en-US" dirty="0"/>
+              <a:t> — we’re talking about user stories at the first lecture, and we’ll be talking about user stories during presentations on the very last day of class. User stories are tools to help us do engineering instead of aimless programming — they keep our focus on people — and they’re tools for keeping groups of people focused on the same goals.</a:t>
+            </a:r>
+          </a:p>
+          <a:p>
+            <a:pPr marL="0" marR="0" lvl="0" indent="0" algn="l" defTabSz="914400" rtl="0" eaLnBrk="1" fontAlgn="auto" latinLnBrk="0" hangingPunct="1">
+              <a:lnSpc>
+                <a:spcPct val="100000"/>
+              </a:lnSpc>
+              <a:spcBef>
+                <a:spcPts val="0"/>
+              </a:spcBef>
+              <a:spcAft>
+                <a:spcPts val="0"/>
+              </a:spcAft>
+              <a:buClrTx/>
+              <a:buSzTx/>
+              <a:buFontTx/>
+              <a:buNone/>
+              <a:tabLst/>
+              <a:defRPr/>
+            </a:pPr>
+            <a:endParaRPr lang="en-US" dirty="0"/>
+          </a:p>
+          <a:p>
+            <a:pPr marL="0" marR="0" lvl="0" indent="0" algn="l" defTabSz="914400" rtl="0" eaLnBrk="1" fontAlgn="auto" latinLnBrk="0" hangingPunct="1">
+              <a:lnSpc>
+                <a:spcPct val="100000"/>
+              </a:lnSpc>
+              <a:spcBef>
+                <a:spcPts val="0"/>
+              </a:spcBef>
+              <a:spcAft>
+                <a:spcPts val="0"/>
+              </a:spcAft>
+              <a:buClrTx/>
+              <a:buSzTx/>
+              <a:buFontTx/>
+              <a:buNone/>
+              <a:tabLst/>
+              <a:defRPr/>
+            </a:pPr>
+            <a:r>
+              <a:rPr lang="en-US" dirty="0"/>
+              <a:t>User stories are a way of capturing the user’s stated goals in a way that hopefully helps us build the right thing (the tire swing) — that’s the main topic for this lecture.</a:t>
+            </a:r>
+          </a:p>
+          <a:p>
+            <a:pPr marL="0" marR="0" lvl="0" indent="0" algn="l" defTabSz="914400" rtl="0" eaLnBrk="1" fontAlgn="auto" latinLnBrk="0" hangingPunct="1">
+              <a:lnSpc>
+                <a:spcPct val="100000"/>
+              </a:lnSpc>
+              <a:spcBef>
+                <a:spcPts val="0"/>
+              </a:spcBef>
+              <a:spcAft>
+                <a:spcPts val="0"/>
+              </a:spcAft>
+              <a:buClrTx/>
+              <a:buSzTx/>
+              <a:buFontTx/>
+              <a:buNone/>
+              <a:tabLst/>
+              <a:defRPr/>
+            </a:pPr>
+            <a:endParaRPr lang="en-US" dirty="0"/>
           </a:p>
         </p:txBody>
       </p:sp>
@@ -3285,32 +3373,6 @@
           <a:p>
             <a:r>
               <a:rPr lang="en-US" dirty="0"/>
-              <a:t>We’re going to talk more about requirements gathering and where user stories actually come from in the next module.</a:t>
-            </a:r>
-          </a:p>
-          <a:p>
-            <a:endParaRPr lang="en-US" dirty="0"/>
-          </a:p>
-          <a:p>
-            <a:r>
-              <a:rPr lang="en-US" dirty="0"/>
-              <a:t>A tool of software engineering that we’ll use centrally this semester is the </a:t>
-            </a:r>
-            <a:r>
-              <a:rPr lang="en-US" b="1" dirty="0"/>
-              <a:t>user story</a:t>
-            </a:r>
-            <a:r>
-              <a:rPr lang="en-US" dirty="0"/>
-              <a:t> — we’re talking about user stories at the first lecture, and we’ll be talking about user stories during presentations on the very last day of class. User stories are tools to help us do engineering instead of aimless programming — they keep our focus on people — and they’re tools for keeping groups of people focused on the same goals.</a:t>
-            </a:r>
-          </a:p>
-          <a:p>
-            <a:endParaRPr lang="en-US" dirty="0"/>
-          </a:p>
-          <a:p>
-            <a:r>
-              <a:rPr lang="en-US" dirty="0"/>
               <a:t>Different organizations describe user stories differently, like how different codebases use different styles. Our course’s style of user story will always have a specific form:</a:t>
             </a:r>
           </a:p>
@@ -4358,7 +4420,7 @@
           <a:p>
             <a:fld id="{5D2A64DE-480B-420F-9649-4F8E696E08E0}" type="datetime1">
               <a:rPr lang="en-US" smtClean="0"/>
-              <a:t>12/30/25</a:t>
+              <a:t>1/1/26</a:t>
             </a:fld>
             <a:endParaRPr lang="en-US"/>
           </a:p>
@@ -4682,7 +4744,7 @@
           <a:p>
             <a:fld id="{EA476A42-A091-4468-A075-64A31BE59948}" type="datetime1">
               <a:rPr lang="en-US" smtClean="0"/>
-              <a:t>12/30/25</a:t>
+              <a:t>1/1/26</a:t>
             </a:fld>
             <a:endParaRPr lang="en-US"/>
           </a:p>
@@ -4880,7 +4942,7 @@
           <a:p>
             <a:fld id="{0D3616D0-8311-4107-9726-6B805E7D05BA}" type="datetime1">
               <a:rPr lang="en-US" smtClean="0"/>
-              <a:t>12/30/25</a:t>
+              <a:t>1/1/26</a:t>
             </a:fld>
             <a:endParaRPr lang="en-US"/>
           </a:p>
@@ -5088,7 +5150,7 @@
           <a:p>
             <a:fld id="{3BC2557A-5C88-417A-A763-5AC779462A5F}" type="datetime1">
               <a:rPr lang="en-US" smtClean="0"/>
-              <a:t>12/30/25</a:t>
+              <a:t>1/1/26</a:t>
             </a:fld>
             <a:endParaRPr lang="en-US"/>
           </a:p>
@@ -5612,7 +5674,7 @@
           <a:p>
             <a:fld id="{07C7BFD4-467E-4EDE-93EA-052F5B39A4E5}" type="datetime1">
               <a:rPr lang="en-US" smtClean="0"/>
-              <a:t>12/30/25</a:t>
+              <a:t>1/1/26</a:t>
             </a:fld>
             <a:endParaRPr lang="en-US"/>
           </a:p>
@@ -5862,7 +5924,7 @@
           <a:p>
             <a:fld id="{07C7BFD4-467E-4EDE-93EA-052F5B39A4E5}" type="datetime1">
               <a:rPr lang="en-US" smtClean="0"/>
-              <a:t>12/30/25</a:t>
+              <a:t>1/1/26</a:t>
             </a:fld>
             <a:endParaRPr lang="en-US"/>
           </a:p>
@@ -6044,7 +6106,7 @@
           <a:p>
             <a:fld id="{109E55A0-C911-4F03-82FC-7E5926047D46}" type="datetime1">
               <a:rPr lang="en-US" smtClean="0"/>
-              <a:t>12/30/25</a:t>
+              <a:t>1/1/26</a:t>
             </a:fld>
             <a:endParaRPr lang="en-US"/>
           </a:p>
@@ -6357,7 +6419,7 @@
           <a:p>
             <a:fld id="{A533CBE2-D5BE-47AC-ADC2-9CDFC1D0CF90}" type="datetime1">
               <a:rPr lang="en-US" smtClean="0"/>
-              <a:t>12/30/25</a:t>
+              <a:t>1/1/26</a:t>
             </a:fld>
             <a:endParaRPr lang="en-US"/>
           </a:p>
@@ -6658,7 +6720,7 @@
           <a:p>
             <a:fld id="{39B7EDB1-CE74-4951-85A2-0B01C2128E28}" type="datetime1">
               <a:rPr lang="en-US" smtClean="0"/>
-              <a:t>12/30/25</a:t>
+              <a:t>1/1/26</a:t>
             </a:fld>
             <a:endParaRPr lang="en-US"/>
           </a:p>
@@ -7106,7 +7168,7 @@
           <a:p>
             <a:fld id="{2BC7EB92-A5C2-4807-A9DC-9EDE6CBFB241}" type="datetime1">
               <a:rPr lang="en-US" smtClean="0"/>
-              <a:t>12/30/25</a:t>
+              <a:t>1/1/26</a:t>
             </a:fld>
             <a:endParaRPr lang="en-US"/>
           </a:p>
@@ -7219,7 +7281,7 @@
           <a:p>
             <a:fld id="{2B7B7EE0-7771-4CD5-9B2B-3550753A54A1}" type="datetime1">
               <a:rPr lang="en-US" smtClean="0"/>
-              <a:t>12/30/25</a:t>
+              <a:t>1/1/26</a:t>
             </a:fld>
             <a:endParaRPr lang="en-US"/>
           </a:p>
@@ -7530,7 +7592,7 @@
           <a:p>
             <a:fld id="{F8B318B3-0E87-4416-A9B8-D891968C2727}" type="datetime1">
               <a:rPr lang="en-US" smtClean="0"/>
-              <a:t>12/30/25</a:t>
+              <a:t>1/1/26</a:t>
             </a:fld>
             <a:endParaRPr lang="en-US"/>
           </a:p>
@@ -7771,7 +7833,7 @@
           <a:p>
             <a:fld id="{54D997E8-DDEE-43F1-8D9B-F8A1E11DE488}" type="datetime1">
               <a:rPr lang="en-US" smtClean="0"/>
-              <a:t>12/30/25</a:t>
+              <a:t>1/1/26</a:t>
             </a:fld>
             <a:endParaRPr lang="en-US"/>
           </a:p>
@@ -10718,7 +10780,7 @@
             <a:pPr lvl="1"/>
             <a:r>
               <a:rPr lang="en-US" dirty="0"/>
-              <a:t>Identify functional and non-functional requirements, and give examples of each </a:t>
+              <a:t>Explain the difference between functional and non-functional requirements, and give examples of each </a:t>
             </a:r>
           </a:p>
           <a:p>
@@ -11861,8 +11923,13 @@
             </a:r>
             <a:r>
               <a:rPr lang="en-US" dirty="0"/>
-              <a:t>are other properties that are also important to users and to other stakeholders?</a:t>
-            </a:r>
+              <a:t>are other properties that are also important to users and to </a:t>
+            </a:r>
+            <a:r>
+              <a:rPr lang="en-US"/>
+              <a:t>other stakeholders</a:t>
+            </a:r>
+            <a:endParaRPr lang="en-US" dirty="0"/>
           </a:p>
           <a:p>
             <a:pPr lvl="1"/>
@@ -13411,7 +13478,7 @@
           <a:p>
             <a:r>
               <a:rPr lang="en-US" dirty="0"/>
-              <a:t>…the least-common-denominator approach documenting the requirements of users when </a:t>
+              <a:t>…a least-common-denominator approach documenting the requirements of users when </a:t>
             </a:r>
             <a:r>
               <a:rPr lang="en-US" b="1" dirty="0"/>

</xml_diff>